<commit_message>
Update to add running
</commit_message>
<xml_diff>
--- a/pdnsloadbalancer.pptx
+++ b/pdnsloadbalancer.pptx
@@ -8,9 +8,10 @@
     <p:sldId id="256" r:id="rId2"/>
     <p:sldId id="257" r:id="rId3"/>
     <p:sldId id="258" r:id="rId4"/>
-    <p:sldId id="259" r:id="rId5"/>
-    <p:sldId id="260" r:id="rId6"/>
-    <p:sldId id="261" r:id="rId7"/>
+    <p:sldId id="262" r:id="rId5"/>
+    <p:sldId id="259" r:id="rId6"/>
+    <p:sldId id="260" r:id="rId7"/>
+    <p:sldId id="261" r:id="rId8"/>
   </p:sldIdLst>
   <p:sldSz cx="12192000" cy="6858000"/>
   <p:notesSz cx="6858000" cy="9144000"/>
@@ -4298,6 +4299,17 @@
             </a:r>
           </a:p>
           <a:p>
+            <a:r>
+              <a:rPr lang="en-US" dirty="0"/>
+              <a:t>All hosts are static addressed via </a:t>
+            </a:r>
+            <a:r>
+              <a:rPr lang="en-US" dirty="0" err="1"/>
+              <a:t>dhcp</a:t>
+            </a:r>
+            <a:endParaRPr lang="en-US" dirty="0"/>
+          </a:p>
+          <a:p>
             <a:endParaRPr lang="en-US" dirty="0"/>
           </a:p>
         </p:txBody>
@@ -4337,7 +4349,7 @@
           <p:cNvPr id="2" name="Title 1">
             <a:extLst>
               <a:ext uri="{FF2B5EF4-FFF2-40B4-BE49-F238E27FC236}">
-                <a16:creationId xmlns:a16="http://schemas.microsoft.com/office/drawing/2014/main" id="{76D6B822-B51D-BC40-A0EC-B35C15896A9E}"/>
+                <a16:creationId xmlns:a16="http://schemas.microsoft.com/office/drawing/2014/main" id="{832D651A-6F15-DF4D-8F9E-058F44AFEFF5}"/>
               </a:ext>
             </a:extLst>
           </p:cNvPr>
@@ -4355,68 +4367,45 @@
           <a:p>
             <a:r>
               <a:rPr lang="en-US" dirty="0"/>
-              <a:t>How’s it implemented</a:t>
-            </a:r>
-          </a:p>
-        </p:txBody>
-      </p:sp>
-      <p:sp>
-        <p:nvSpPr>
-          <p:cNvPr id="3" name="Content Placeholder 2">
-            <a:extLst>
-              <a:ext uri="{FF2B5EF4-FFF2-40B4-BE49-F238E27FC236}">
-                <a16:creationId xmlns:a16="http://schemas.microsoft.com/office/drawing/2014/main" id="{C61B5154-DF48-C144-92DB-BB3A57FF66A2}"/>
-              </a:ext>
-            </a:extLst>
-          </p:cNvPr>
-          <p:cNvSpPr>
-            <a:spLocks noGrp="1"/>
-          </p:cNvSpPr>
-          <p:nvPr>
-            <p:ph idx="1"/>
-          </p:nvPr>
-        </p:nvSpPr>
-        <p:spPr/>
-        <p:txBody>
-          <a:bodyPr/>
-          <a:lstStyle/>
-          <a:p>
-            <a:r>
-              <a:rPr lang="en-US" dirty="0"/>
-              <a:t>Implemented as a </a:t>
-            </a:r>
-            <a:r>
-              <a:rPr lang="en-US" dirty="0" err="1"/>
-              <a:t>golang</a:t>
-            </a:r>
-            <a:r>
-              <a:rPr lang="en-US" dirty="0"/>
-              <a:t> executable, making rest calls to </a:t>
-            </a:r>
-            <a:r>
-              <a:rPr lang="en-US" dirty="0" err="1"/>
-              <a:t>pdns</a:t>
-            </a:r>
-            <a:r>
-              <a:rPr lang="en-US" dirty="0"/>
-              <a:t>.</a:t>
-            </a:r>
-          </a:p>
-          <a:p>
-            <a:r>
-              <a:rPr lang="en-US" dirty="0"/>
-              <a:t>242 Lines of Go Code</a:t>
-            </a:r>
-          </a:p>
-          <a:p>
-            <a:endParaRPr lang="en-US" dirty="0"/>
-          </a:p>
-        </p:txBody>
-      </p:sp>
+              <a:t>Running</a:t>
+            </a:r>
+          </a:p>
+        </p:txBody>
+      </p:sp>
+      <p:pic>
+        <p:nvPicPr>
+          <p:cNvPr id="6" name="Picture 5" descr="A picture containing table&#10;&#10;Description automatically generated">
+            <a:extLst>
+              <a:ext uri="{FF2B5EF4-FFF2-40B4-BE49-F238E27FC236}">
+                <a16:creationId xmlns:a16="http://schemas.microsoft.com/office/drawing/2014/main" id="{A7978B89-391C-CA42-B930-E32ACBFF8A13}"/>
+              </a:ext>
+            </a:extLst>
+          </p:cNvPr>
+          <p:cNvPicPr>
+            <a:picLocks noChangeAspect="1"/>
+          </p:cNvPicPr>
+          <p:nvPr/>
+        </p:nvPicPr>
+        <p:blipFill>
+          <a:blip r:embed="rId2"/>
+          <a:stretch>
+            <a:fillRect/>
+          </a:stretch>
+        </p:blipFill>
+        <p:spPr>
+          <a:xfrm>
+            <a:off x="667265" y="2429593"/>
+            <a:ext cx="7241059" cy="7099425"/>
+          </a:xfrm>
+          <a:prstGeom prst="rect">
+            <a:avLst/>
+          </a:prstGeom>
+        </p:spPr>
+      </p:pic>
     </p:spTree>
     <p:extLst>
       <p:ext uri="{BB962C8B-B14F-4D97-AF65-F5344CB8AC3E}">
-        <p14:creationId xmlns:p14="http://schemas.microsoft.com/office/powerpoint/2010/main" val="1099560293"/>
+        <p14:creationId xmlns:p14="http://schemas.microsoft.com/office/powerpoint/2010/main" val="3057760576"/>
       </p:ext>
     </p:extLst>
   </p:cSld>
@@ -4448,7 +4437,7 @@
           <p:cNvPr id="2" name="Title 1">
             <a:extLst>
               <a:ext uri="{FF2B5EF4-FFF2-40B4-BE49-F238E27FC236}">
-                <a16:creationId xmlns:a16="http://schemas.microsoft.com/office/drawing/2014/main" id="{400BDFF7-0098-144D-BA2B-BCFAD74E6010}"/>
+                <a16:creationId xmlns:a16="http://schemas.microsoft.com/office/drawing/2014/main" id="{76D6B822-B51D-BC40-A0EC-B35C15896A9E}"/>
               </a:ext>
             </a:extLst>
           </p:cNvPr>
@@ -4466,7 +4455,7 @@
           <a:p>
             <a:r>
               <a:rPr lang="en-US" dirty="0"/>
-              <a:t>Enhancements</a:t>
+              <a:t>How’s it implemented</a:t>
             </a:r>
           </a:p>
         </p:txBody>
@@ -4476,7 +4465,7 @@
           <p:cNvPr id="3" name="Content Placeholder 2">
             <a:extLst>
               <a:ext uri="{FF2B5EF4-FFF2-40B4-BE49-F238E27FC236}">
-                <a16:creationId xmlns:a16="http://schemas.microsoft.com/office/drawing/2014/main" id="{1DCBDBF1-4285-0248-B3C0-234C6CC29022}"/>
+                <a16:creationId xmlns:a16="http://schemas.microsoft.com/office/drawing/2014/main" id="{C61B5154-DF48-C144-92DB-BB3A57FF66A2}"/>
               </a:ext>
             </a:extLst>
           </p:cNvPr>
@@ -4494,7 +4483,15 @@
           <a:p>
             <a:r>
               <a:rPr lang="en-US" dirty="0"/>
-              <a:t>There a full open field in </a:t>
+              <a:t>Implemented as a </a:t>
+            </a:r>
+            <a:r>
+              <a:rPr lang="en-US" dirty="0" err="1"/>
+              <a:t>golang</a:t>
+            </a:r>
+            <a:r>
+              <a:rPr lang="en-US" dirty="0"/>
+              <a:t> executable, making rest calls to </a:t>
             </a:r>
             <a:r>
               <a:rPr lang="en-US" dirty="0" err="1"/>
@@ -4502,15 +4499,24 @@
             </a:r>
             <a:r>
               <a:rPr lang="en-US" dirty="0"/>
-              <a:t>, so a rest based health check would be easy to implement. Or even multiple different types. Embedded json has a lot of power.</a:t>
-            </a:r>
+              <a:t>.</a:t>
+            </a:r>
+          </a:p>
+          <a:p>
+            <a:r>
+              <a:rPr lang="en-US" dirty="0"/>
+              <a:t>242 Lines of Go Code</a:t>
+            </a:r>
+          </a:p>
+          <a:p>
+            <a:endParaRPr lang="en-US" dirty="0"/>
           </a:p>
         </p:txBody>
       </p:sp>
     </p:spTree>
     <p:extLst>
       <p:ext uri="{BB962C8B-B14F-4D97-AF65-F5344CB8AC3E}">
-        <p14:creationId xmlns:p14="http://schemas.microsoft.com/office/powerpoint/2010/main" val="1184409536"/>
+        <p14:creationId xmlns:p14="http://schemas.microsoft.com/office/powerpoint/2010/main" val="1099560293"/>
       </p:ext>
     </p:extLst>
   </p:cSld>
@@ -4542,6 +4548,100 @@
           <p:cNvPr id="2" name="Title 1">
             <a:extLst>
               <a:ext uri="{FF2B5EF4-FFF2-40B4-BE49-F238E27FC236}">
+                <a16:creationId xmlns:a16="http://schemas.microsoft.com/office/drawing/2014/main" id="{400BDFF7-0098-144D-BA2B-BCFAD74E6010}"/>
+              </a:ext>
+            </a:extLst>
+          </p:cNvPr>
+          <p:cNvSpPr>
+            <a:spLocks noGrp="1"/>
+          </p:cNvSpPr>
+          <p:nvPr>
+            <p:ph type="title"/>
+          </p:nvPr>
+        </p:nvSpPr>
+        <p:spPr/>
+        <p:txBody>
+          <a:bodyPr/>
+          <a:lstStyle/>
+          <a:p>
+            <a:r>
+              <a:rPr lang="en-US" dirty="0"/>
+              <a:t>Enhancements</a:t>
+            </a:r>
+          </a:p>
+        </p:txBody>
+      </p:sp>
+      <p:sp>
+        <p:nvSpPr>
+          <p:cNvPr id="3" name="Content Placeholder 2">
+            <a:extLst>
+              <a:ext uri="{FF2B5EF4-FFF2-40B4-BE49-F238E27FC236}">
+                <a16:creationId xmlns:a16="http://schemas.microsoft.com/office/drawing/2014/main" id="{1DCBDBF1-4285-0248-B3C0-234C6CC29022}"/>
+              </a:ext>
+            </a:extLst>
+          </p:cNvPr>
+          <p:cNvSpPr>
+            <a:spLocks noGrp="1"/>
+          </p:cNvSpPr>
+          <p:nvPr>
+            <p:ph idx="1"/>
+          </p:nvPr>
+        </p:nvSpPr>
+        <p:spPr/>
+        <p:txBody>
+          <a:bodyPr/>
+          <a:lstStyle/>
+          <a:p>
+            <a:r>
+              <a:rPr lang="en-US" dirty="0"/>
+              <a:t>There a full open field in </a:t>
+            </a:r>
+            <a:r>
+              <a:rPr lang="en-US" dirty="0" err="1"/>
+              <a:t>pdns</a:t>
+            </a:r>
+            <a:r>
+              <a:rPr lang="en-US" dirty="0"/>
+              <a:t>, so a rest based health check would be easy to implement. Or even multiple different types. Embedded json has a lot of power.</a:t>
+            </a:r>
+          </a:p>
+        </p:txBody>
+      </p:sp>
+    </p:spTree>
+    <p:extLst>
+      <p:ext uri="{BB962C8B-B14F-4D97-AF65-F5344CB8AC3E}">
+        <p14:creationId xmlns:p14="http://schemas.microsoft.com/office/powerpoint/2010/main" val="1184409536"/>
+      </p:ext>
+    </p:extLst>
+  </p:cSld>
+  <p:clrMapOvr>
+    <a:masterClrMapping/>
+  </p:clrMapOvr>
+</p:sld>
+</file>
+
+<file path=ppt/slides/slide7.xml><?xml version="1.0" encoding="utf-8"?>
+<p:sld xmlns:a="http://schemas.openxmlformats.org/drawingml/2006/main" xmlns:r="http://schemas.openxmlformats.org/officeDocument/2006/relationships" xmlns:p="http://schemas.openxmlformats.org/presentationml/2006/main">
+  <p:cSld>
+    <p:spTree>
+      <p:nvGrpSpPr>
+        <p:cNvPr id="1" name=""/>
+        <p:cNvGrpSpPr/>
+        <p:nvPr/>
+      </p:nvGrpSpPr>
+      <p:grpSpPr>
+        <a:xfrm>
+          <a:off x="0" y="0"/>
+          <a:ext cx="0" cy="0"/>
+          <a:chOff x="0" y="0"/>
+          <a:chExt cx="0" cy="0"/>
+        </a:xfrm>
+      </p:grpSpPr>
+      <p:sp>
+        <p:nvSpPr>
+          <p:cNvPr id="2" name="Title 1">
+            <a:extLst>
+              <a:ext uri="{FF2B5EF4-FFF2-40B4-BE49-F238E27FC236}">
                 <a16:creationId xmlns:a16="http://schemas.microsoft.com/office/drawing/2014/main" id="{E8505947-8573-7047-8D25-7CE8B31A5A8B}"/>
               </a:ext>
             </a:extLst>
@@ -4592,10 +4692,10 @@
               </a:rPr>
               <a:t>https://github.com/glennswest/pdnsloadbalancer</a:t>
             </a:r>
-            <a:endParaRPr lang="en-US"/>
-          </a:p>
-          <a:p>
-            <a:endParaRPr lang="en-US"/>
+            <a:endParaRPr lang="en-US" dirty="0"/>
+          </a:p>
+          <a:p>
+            <a:endParaRPr lang="en-US" dirty="0"/>
           </a:p>
         </p:txBody>
       </p:sp>

</xml_diff>